<commit_message>
Deployed d9e3d6b with MkDocs version: 1.6.1
</commit_message>
<xml_diff>
--- a/uploads/w4/Pertemuan ke 4 - Jaringan dan Telekomunikasi - FInal.pptx
+++ b/uploads/w4/Pertemuan ke 4 - Jaringan dan Telekomunikasi - FInal.pptx
@@ -176,6 +176,30 @@
 <file path=ppt/changesInfos/changesInfo1.xml><?xml version="1.0" encoding="utf-8"?>
 <pc:chgInfo xmlns:a="http://schemas.openxmlformats.org/drawingml/2006/main" xmlns:r="http://schemas.openxmlformats.org/officeDocument/2006/relationships" xmlns:ac="http://schemas.microsoft.com/office/drawing/2013/main/command" xmlns:pc="http://schemas.microsoft.com/office/powerpoint/2013/main/command">
   <pc:docChgLst>
+    <pc:chgData name="Reza Rizky Pratama" userId="771d31ed-b943-4b12-ae2a-45414c129b8c" providerId="ADAL" clId="{153D1BEC-6528-40E7-8E53-7B1D444316C9}"/>
+    <pc:docChg chg="custSel modSld">
+      <pc:chgData name="Reza Rizky Pratama" userId="771d31ed-b943-4b12-ae2a-45414c129b8c" providerId="ADAL" clId="{153D1BEC-6528-40E7-8E53-7B1D444316C9}" dt="2024-11-07T05:27:40.196" v="17" actId="20577"/>
+      <pc:docMkLst>
+        <pc:docMk/>
+      </pc:docMkLst>
+      <pc:sldChg chg="modSp mod">
+        <pc:chgData name="Reza Rizky Pratama" userId="771d31ed-b943-4b12-ae2a-45414c129b8c" providerId="ADAL" clId="{153D1BEC-6528-40E7-8E53-7B1D444316C9}" dt="2024-11-07T05:27:40.196" v="17" actId="20577"/>
+        <pc:sldMkLst>
+          <pc:docMk/>
+          <pc:sldMk cId="2207906258" sldId="844"/>
+        </pc:sldMkLst>
+        <pc:spChg chg="mod">
+          <ac:chgData name="Reza Rizky Pratama" userId="771d31ed-b943-4b12-ae2a-45414c129b8c" providerId="ADAL" clId="{153D1BEC-6528-40E7-8E53-7B1D444316C9}" dt="2024-11-07T05:27:40.196" v="17" actId="20577"/>
+          <ac:spMkLst>
+            <pc:docMk/>
+            <pc:sldMk cId="2207906258" sldId="844"/>
+            <ac:spMk id="5" creationId="{00000000-0000-0000-0000-000000000000}"/>
+          </ac:spMkLst>
+        </pc:spChg>
+      </pc:sldChg>
+    </pc:docChg>
+  </pc:docChgLst>
+  <pc:docChgLst>
     <pc:chgData name="Teuku Raja Irfan Radarma" userId="cf428174-95ba-4576-8554-3a3b8ffa52b7" providerId="ADAL" clId="{43662E93-C377-4484-8357-E8910B86B47B}"/>
     <pc:docChg chg="modSld">
       <pc:chgData name="Teuku Raja Irfan Radarma" userId="cf428174-95ba-4576-8554-3a3b8ffa52b7" providerId="ADAL" clId="{43662E93-C377-4484-8357-E8910B86B47B}" dt="2023-10-12T01:55:25.034" v="0" actId="20577"/>
@@ -284,7 +308,7 @@
           <a:p>
             <a:fld id="{A92070AC-2B69-4C67-A9A1-73BED6DF5D79}" type="datetimeFigureOut">
               <a:rPr lang="en-US" smtClean="0"/>
-              <a:t>10/11/2023</a:t>
+              <a:t>11/7/2024</a:t>
             </a:fld>
             <a:endParaRPr lang="en-US" dirty="0"/>
           </a:p>
@@ -1951,7 +1975,7 @@
                   <a:prstClr val="white"/>
                 </a:solidFill>
               </a:rPr>
-              <a:t>10/11/2023</a:t>
+              <a:t>11/7/2024</a:t>
             </a:fld>
             <a:endParaRPr lang="en-US" dirty="0">
               <a:solidFill>
@@ -2345,7 +2369,7 @@
                   </a:prstClr>
                 </a:solidFill>
               </a:rPr>
-              <a:t>10/11/2023</a:t>
+              <a:t>11/7/2024</a:t>
             </a:fld>
             <a:endParaRPr lang="en-US" dirty="0">
               <a:solidFill>
@@ -4188,7 +4212,7 @@
           <a:p>
             <a:fld id="{F6256D38-0405-4CE4-A2A4-B1F49A27DF9C}" type="datetime1">
               <a:rPr lang="en-US" smtClean="0"/>
-              <a:t>10/11/2023</a:t>
+              <a:t>11/7/2024</a:t>
             </a:fld>
             <a:endParaRPr lang="en-US" dirty="0"/>
           </a:p>
@@ -4695,7 +4719,7 @@
                   <a:prstClr val="white"/>
                 </a:solidFill>
               </a:rPr>
-              <a:t>10/11/2023</a:t>
+              <a:t>11/7/2024</a:t>
             </a:fld>
             <a:endParaRPr lang="en-US" dirty="0">
               <a:solidFill>
@@ -5056,7 +5080,7 @@
           <a:p>
             <a:fld id="{B33742F2-6D99-486D-8848-CD9D61A3147F}" type="datetime1">
               <a:rPr lang="en-US" smtClean="0"/>
-              <a:t>10/11/2023</a:t>
+              <a:t>11/7/2024</a:t>
             </a:fld>
             <a:endParaRPr lang="en-US" dirty="0"/>
           </a:p>
@@ -5544,7 +5568,7 @@
           <a:p>
             <a:fld id="{1FF48EFD-E125-49CB-A514-2A51628F9FEC}" type="datetime1">
               <a:rPr lang="en-US" smtClean="0"/>
-              <a:t>10/11/2023</a:t>
+              <a:t>11/7/2024</a:t>
             </a:fld>
             <a:endParaRPr lang="en-US" dirty="0"/>
           </a:p>
@@ -5737,7 +5761,7 @@
           <a:p>
             <a:fld id="{01B7A4E9-8F28-416E-AB9B-6B37F91A72C0}" type="datetime1">
               <a:rPr lang="en-US" smtClean="0"/>
-              <a:t>10/11/2023</a:t>
+              <a:t>11/7/2024</a:t>
             </a:fld>
             <a:endParaRPr lang="en-US" dirty="0"/>
           </a:p>
@@ -5896,7 +5920,7 @@
           <a:p>
             <a:fld id="{BD424CD5-80D2-4112-9AE5-01B02260C8E8}" type="datetime1">
               <a:rPr lang="en-US" smtClean="0"/>
-              <a:t>10/11/2023</a:t>
+              <a:t>11/7/2024</a:t>
             </a:fld>
             <a:endParaRPr lang="en-US" dirty="0"/>
           </a:p>
@@ -6193,7 +6217,7 @@
                   </a:prstClr>
                 </a:solidFill>
               </a:rPr>
-              <a:t>10/11/2023</a:t>
+              <a:t>11/7/2024</a:t>
             </a:fld>
             <a:endParaRPr lang="en-US" dirty="0">
               <a:solidFill>
@@ -6518,7 +6542,7 @@
                   </a:prstClr>
                 </a:solidFill>
               </a:rPr>
-              <a:t>10/11/2023</a:t>
+              <a:t>11/7/2024</a:t>
             </a:fld>
             <a:endParaRPr lang="en-US" dirty="0">
               <a:solidFill>
@@ -6942,7 +6966,7 @@
           <a:p>
             <a:fld id="{74F60C60-2E1F-45C2-9272-67C39C48D034}" type="datetime1">
               <a:rPr lang="en-US" smtClean="0"/>
-              <a:t>10/11/2023</a:t>
+              <a:t>11/7/2024</a:t>
             </a:fld>
             <a:endParaRPr lang="en-US" dirty="0"/>
           </a:p>
@@ -20764,7 +20788,7 @@
         </p:spPr>
         <p:txBody>
           <a:bodyPr>
-            <a:normAutofit lnSpcReduction="10000"/>
+            <a:normAutofit fontScale="92500" lnSpcReduction="20000"/>
           </a:bodyPr>
           <a:lstStyle/>
           <a:p>
@@ -20781,7 +20805,7 @@
           </a:p>
           <a:p>
             <a:r>
-              <a:rPr lang="en-US" noProof="1"/>
+              <a:rPr lang="en-US" b="1" noProof="1"/>
               <a:t>Ganti Password Administrator Default</a:t>
             </a:r>
           </a:p>
@@ -20807,6 +20831,18 @@
             <a:r>
               <a:rPr lang="en-US" noProof="1"/>
               <a:t>Berikan alamat IP Statis pada perangkat WiFi</a:t>
+            </a:r>
+          </a:p>
+          <a:p>
+            <a:endParaRPr lang="en-US" noProof="1"/>
+          </a:p>
+          <a:p>
+            <a:pPr marL="0" indent="0">
+              <a:buNone/>
+            </a:pPr>
+            <a:r>
+              <a:rPr lang="en-US" noProof="1"/>
+              <a:t>192.168.0.1</a:t>
             </a:r>
           </a:p>
         </p:txBody>

</xml_diff>